<commit_message>
Data Makalah Revisi 1
</commit_message>
<xml_diff>
--- a/Data Dari Jurnal Teknologi Kebencanaan.pptx
+++ b/Data Dari Jurnal Teknologi Kebencanaan.pptx
@@ -312,7 +312,7 @@
             <a:fld id="{1D8BD707-D9CF-40AE-B4C6-C98DA3205C09}" type="datetimeFigureOut">
               <a:rPr lang="en-US" smtClean="0"/>
               <a:pPr/>
-              <a:t>9/22/2016</a:t>
+              <a:t>9/23/2016</a:t>
             </a:fld>
             <a:endParaRPr lang="en-US"/>
           </a:p>
@@ -366,6 +366,18 @@
   <p:clrMapOvr>
     <a:masterClrMapping/>
   </p:clrMapOvr>
+  <mc:AlternateContent xmlns:mc="http://schemas.openxmlformats.org/markup-compatibility/2006">
+    <mc:Choice xmlns:p14="http://schemas.microsoft.com/office/powerpoint/2010/main" Requires="p14">
+      <p:transition spd="med" p14:dur="700">
+        <p:fade/>
+      </p:transition>
+    </mc:Choice>
+    <mc:Fallback>
+      <p:transition spd="med">
+        <p:fade/>
+      </p:transition>
+    </mc:Fallback>
+  </mc:AlternateContent>
 </p:sldLayout>
 </file>
 
@@ -479,7 +491,7 @@
             <a:fld id="{1D8BD707-D9CF-40AE-B4C6-C98DA3205C09}" type="datetimeFigureOut">
               <a:rPr lang="en-US" smtClean="0"/>
               <a:pPr/>
-              <a:t>9/22/2016</a:t>
+              <a:t>9/23/2016</a:t>
             </a:fld>
             <a:endParaRPr lang="en-US"/>
           </a:p>
@@ -533,6 +545,18 @@
   <p:clrMapOvr>
     <a:masterClrMapping/>
   </p:clrMapOvr>
+  <mc:AlternateContent xmlns:mc="http://schemas.openxmlformats.org/markup-compatibility/2006">
+    <mc:Choice xmlns:p14="http://schemas.microsoft.com/office/powerpoint/2010/main" Requires="p14">
+      <p:transition spd="med" p14:dur="700">
+        <p:fade/>
+      </p:transition>
+    </mc:Choice>
+    <mc:Fallback>
+      <p:transition spd="med">
+        <p:fade/>
+      </p:transition>
+    </mc:Fallback>
+  </mc:AlternateContent>
 </p:sldLayout>
 </file>
 
@@ -656,7 +680,7 @@
             <a:fld id="{1D8BD707-D9CF-40AE-B4C6-C98DA3205C09}" type="datetimeFigureOut">
               <a:rPr lang="en-US" smtClean="0"/>
               <a:pPr/>
-              <a:t>9/22/2016</a:t>
+              <a:t>9/23/2016</a:t>
             </a:fld>
             <a:endParaRPr lang="en-US"/>
           </a:p>
@@ -710,6 +734,18 @@
   <p:clrMapOvr>
     <a:masterClrMapping/>
   </p:clrMapOvr>
+  <mc:AlternateContent xmlns:mc="http://schemas.openxmlformats.org/markup-compatibility/2006">
+    <mc:Choice xmlns:p14="http://schemas.microsoft.com/office/powerpoint/2010/main" Requires="p14">
+      <p:transition spd="med" p14:dur="700">
+        <p:fade/>
+      </p:transition>
+    </mc:Choice>
+    <mc:Fallback>
+      <p:transition spd="med">
+        <p:fade/>
+      </p:transition>
+    </mc:Fallback>
+  </mc:AlternateContent>
 </p:sldLayout>
 </file>
 
@@ -841,7 +877,7 @@
             <a:fld id="{1D8BD707-D9CF-40AE-B4C6-C98DA3205C09}" type="datetimeFigureOut">
               <a:rPr lang="en-US" smtClean="0"/>
               <a:pPr/>
-              <a:t>9/22/2016</a:t>
+              <a:t>9/23/2016</a:t>
             </a:fld>
             <a:endParaRPr lang="en-US"/>
           </a:p>
@@ -895,6 +931,18 @@
   <p:clrMapOvr>
     <a:masterClrMapping/>
   </p:clrMapOvr>
+  <mc:AlternateContent xmlns:mc="http://schemas.openxmlformats.org/markup-compatibility/2006">
+    <mc:Choice xmlns:p14="http://schemas.microsoft.com/office/powerpoint/2010/main" Requires="p14">
+      <p:transition spd="med" p14:dur="700">
+        <p:fade/>
+      </p:transition>
+    </mc:Choice>
+    <mc:Fallback>
+      <p:transition spd="med">
+        <p:fade/>
+      </p:transition>
+    </mc:Fallback>
+  </mc:AlternateContent>
 </p:sldLayout>
 </file>
 
@@ -1105,7 +1153,7 @@
             <a:fld id="{1D8BD707-D9CF-40AE-B4C6-C98DA3205C09}" type="datetimeFigureOut">
               <a:rPr lang="en-US" smtClean="0"/>
               <a:pPr/>
-              <a:t>9/22/2016</a:t>
+              <a:t>9/23/2016</a:t>
             </a:fld>
             <a:endParaRPr lang="en-US"/>
           </a:p>
@@ -1309,6 +1357,18 @@
   <p:clrMapOvr>
     <a:masterClrMapping/>
   </p:clrMapOvr>
+  <mc:AlternateContent xmlns:mc="http://schemas.openxmlformats.org/markup-compatibility/2006">
+    <mc:Choice xmlns:p14="http://schemas.microsoft.com/office/powerpoint/2010/main" Requires="p14">
+      <p:transition spd="med" p14:dur="700">
+        <p:fade/>
+      </p:transition>
+    </mc:Choice>
+    <mc:Fallback>
+      <p:transition spd="med">
+        <p:fade/>
+      </p:transition>
+    </mc:Fallback>
+  </mc:AlternateContent>
 </p:sldLayout>
 </file>
 
@@ -1455,7 +1515,7 @@
             <a:fld id="{1D8BD707-D9CF-40AE-B4C6-C98DA3205C09}" type="datetimeFigureOut">
               <a:rPr lang="en-US" smtClean="0"/>
               <a:pPr/>
-              <a:t>9/22/2016</a:t>
+              <a:t>9/23/2016</a:t>
             </a:fld>
             <a:endParaRPr lang="en-US"/>
           </a:p>
@@ -1566,6 +1626,18 @@
   <p:clrMapOvr>
     <a:masterClrMapping/>
   </p:clrMapOvr>
+  <mc:AlternateContent xmlns:mc="http://schemas.openxmlformats.org/markup-compatibility/2006">
+    <mc:Choice xmlns:p14="http://schemas.microsoft.com/office/powerpoint/2010/main" Requires="p14">
+      <p:transition spd="med" p14:dur="700">
+        <p:fade/>
+      </p:transition>
+    </mc:Choice>
+    <mc:Fallback>
+      <p:transition spd="med">
+        <p:fade/>
+      </p:transition>
+    </mc:Fallback>
+  </mc:AlternateContent>
 </p:sldLayout>
 </file>
 
@@ -1765,7 +1837,7 @@
             <a:fld id="{1D8BD707-D9CF-40AE-B4C6-C98DA3205C09}" type="datetimeFigureOut">
               <a:rPr lang="en-US" smtClean="0"/>
               <a:pPr/>
-              <a:t>9/22/2016</a:t>
+              <a:t>9/23/2016</a:t>
             </a:fld>
             <a:endParaRPr lang="en-US"/>
           </a:p>
@@ -1933,6 +2005,18 @@
   <p:clrMapOvr>
     <a:masterClrMapping/>
   </p:clrMapOvr>
+  <mc:AlternateContent xmlns:mc="http://schemas.openxmlformats.org/markup-compatibility/2006">
+    <mc:Choice xmlns:p14="http://schemas.microsoft.com/office/powerpoint/2010/main" Requires="p14">
+      <p:transition spd="med" p14:dur="700">
+        <p:fade/>
+      </p:transition>
+    </mc:Choice>
+    <mc:Fallback>
+      <p:transition spd="med">
+        <p:fade/>
+      </p:transition>
+    </mc:Fallback>
+  </mc:AlternateContent>
 </p:sldLayout>
 </file>
 
@@ -1994,7 +2078,7 @@
             <a:fld id="{1D8BD707-D9CF-40AE-B4C6-C98DA3205C09}" type="datetimeFigureOut">
               <a:rPr lang="en-US" smtClean="0"/>
               <a:pPr/>
-              <a:t>9/22/2016</a:t>
+              <a:t>9/23/2016</a:t>
             </a:fld>
             <a:endParaRPr lang="en-US"/>
           </a:p>
@@ -2048,6 +2132,18 @@
   <p:clrMapOvr>
     <a:masterClrMapping/>
   </p:clrMapOvr>
+  <mc:AlternateContent xmlns:mc="http://schemas.openxmlformats.org/markup-compatibility/2006">
+    <mc:Choice xmlns:p14="http://schemas.microsoft.com/office/powerpoint/2010/main" Requires="p14">
+      <p:transition spd="med" p14:dur="700">
+        <p:fade/>
+      </p:transition>
+    </mc:Choice>
+    <mc:Fallback>
+      <p:transition spd="med">
+        <p:fade/>
+      </p:transition>
+    </mc:Fallback>
+  </mc:AlternateContent>
 </p:sldLayout>
 </file>
 
@@ -2086,7 +2182,7 @@
             <a:fld id="{1D8BD707-D9CF-40AE-B4C6-C98DA3205C09}" type="datetimeFigureOut">
               <a:rPr lang="en-US" smtClean="0"/>
               <a:pPr/>
-              <a:t>9/22/2016</a:t>
+              <a:t>9/23/2016</a:t>
             </a:fld>
             <a:endParaRPr lang="en-US"/>
           </a:p>
@@ -2140,6 +2236,18 @@
   <p:clrMapOvr>
     <a:masterClrMapping/>
   </p:clrMapOvr>
+  <mc:AlternateContent xmlns:mc="http://schemas.openxmlformats.org/markup-compatibility/2006">
+    <mc:Choice xmlns:p14="http://schemas.microsoft.com/office/powerpoint/2010/main" Requires="p14">
+      <p:transition spd="med" p14:dur="700">
+        <p:fade/>
+      </p:transition>
+    </mc:Choice>
+    <mc:Fallback>
+      <p:transition spd="med">
+        <p:fade/>
+      </p:transition>
+    </mc:Fallback>
+  </mc:AlternateContent>
 </p:sldLayout>
 </file>
 
@@ -2376,7 +2484,7 @@
             <a:fld id="{1D8BD707-D9CF-40AE-B4C6-C98DA3205C09}" type="datetimeFigureOut">
               <a:rPr lang="en-US" smtClean="0"/>
               <a:pPr/>
-              <a:t>9/22/2016</a:t>
+              <a:t>9/23/2016</a:t>
             </a:fld>
             <a:endParaRPr lang="en-US"/>
           </a:p>
@@ -2430,6 +2538,18 @@
   <p:clrMapOvr>
     <a:masterClrMapping/>
   </p:clrMapOvr>
+  <mc:AlternateContent xmlns:mc="http://schemas.openxmlformats.org/markup-compatibility/2006">
+    <mc:Choice xmlns:p14="http://schemas.microsoft.com/office/powerpoint/2010/main" Requires="p14">
+      <p:transition spd="med" p14:dur="700">
+        <p:fade/>
+      </p:transition>
+    </mc:Choice>
+    <mc:Fallback>
+      <p:transition spd="med">
+        <p:fade/>
+      </p:transition>
+    </mc:Fallback>
+  </mc:AlternateContent>
 </p:sldLayout>
 </file>
 
@@ -2647,7 +2767,7 @@
             <a:fld id="{1D8BD707-D9CF-40AE-B4C6-C98DA3205C09}" type="datetimeFigureOut">
               <a:rPr lang="en-US" smtClean="0"/>
               <a:pPr/>
-              <a:t>9/22/2016</a:t>
+              <a:t>9/23/2016</a:t>
             </a:fld>
             <a:endParaRPr lang="en-US"/>
           </a:p>
@@ -2701,6 +2821,18 @@
   <p:clrMapOvr>
     <a:masterClrMapping/>
   </p:clrMapOvr>
+  <mc:AlternateContent xmlns:mc="http://schemas.openxmlformats.org/markup-compatibility/2006">
+    <mc:Choice xmlns:p14="http://schemas.microsoft.com/office/powerpoint/2010/main" Requires="p14">
+      <p:transition spd="med" p14:dur="700">
+        <p:fade/>
+      </p:transition>
+    </mc:Choice>
+    <mc:Fallback>
+      <p:transition spd="med">
+        <p:fade/>
+      </p:transition>
+    </mc:Fallback>
+  </mc:AlternateContent>
 </p:sldLayout>
 </file>
 
@@ -2859,7 +2991,7 @@
             <a:fld id="{1D8BD707-D9CF-40AE-B4C6-C98DA3205C09}" type="datetimeFigureOut">
               <a:rPr lang="en-US" smtClean="0"/>
               <a:pPr/>
-              <a:t>9/22/2016</a:t>
+              <a:t>9/23/2016</a:t>
             </a:fld>
             <a:endParaRPr lang="en-US"/>
           </a:p>
@@ -3071,6 +3203,18 @@
     <p:sldLayoutId id="2147483670" r:id="rId10"/>
     <p:sldLayoutId id="2147483671" r:id="rId11"/>
   </p:sldLayoutIdLst>
+  <mc:AlternateContent xmlns:mc="http://schemas.openxmlformats.org/markup-compatibility/2006">
+    <mc:Choice xmlns:p14="http://schemas.microsoft.com/office/powerpoint/2010/main" Requires="p14">
+      <p:transition spd="med" p14:dur="700">
+        <p:fade/>
+      </p:transition>
+    </mc:Choice>
+    <mc:Fallback>
+      <p:transition spd="med">
+        <p:fade/>
+      </p:transition>
+    </mc:Fallback>
+  </mc:AlternateContent>
   <p:txStyles>
     <p:titleStyle>
       <a:lvl1pPr algn="ctr" defTabSz="914400" rtl="0" eaLnBrk="1" latinLnBrk="0" hangingPunct="1">
@@ -3457,6 +3601,25 @@
   <p:clrMapOvr>
     <a:masterClrMapping/>
   </p:clrMapOvr>
+  <mc:AlternateContent xmlns:mc="http://schemas.openxmlformats.org/markup-compatibility/2006">
+    <mc:Choice xmlns:p14="http://schemas.microsoft.com/office/powerpoint/2010/main" Requires="p14">
+      <p:transition spd="med" p14:dur="700">
+        <p:fade/>
+      </p:transition>
+    </mc:Choice>
+    <mc:Fallback>
+      <p:transition spd="med">
+        <p:fade/>
+      </p:transition>
+    </mc:Fallback>
+  </mc:AlternateContent>
+  <p:timing>
+    <p:tnLst>
+      <p:par>
+        <p:cTn id="1" dur="indefinite" restart="never" nodeType="tmRoot"/>
+      </p:par>
+    </p:tnLst>
+  </p:timing>
 </p:sld>
 </file>
 
@@ -3490,7 +3653,7 @@
         <p:spPr/>
         <p:txBody>
           <a:bodyPr>
-            <a:normAutofit fontScale="90000"/>
+            <a:normAutofit/>
           </a:bodyPr>
           <a:lstStyle/>
           <a:p>
@@ -3565,6 +3728,25 @@
   <p:clrMapOvr>
     <a:masterClrMapping/>
   </p:clrMapOvr>
+  <mc:AlternateContent xmlns:mc="http://schemas.openxmlformats.org/markup-compatibility/2006">
+    <mc:Choice xmlns:p14="http://schemas.microsoft.com/office/powerpoint/2010/main" Requires="p14">
+      <p:transition spd="med" p14:dur="700">
+        <p:fade/>
+      </p:transition>
+    </mc:Choice>
+    <mc:Fallback>
+      <p:transition spd="med">
+        <p:fade/>
+      </p:transition>
+    </mc:Fallback>
+  </mc:AlternateContent>
+  <p:timing>
+    <p:tnLst>
+      <p:par>
+        <p:cTn id="1" dur="indefinite" restart="never" nodeType="tmRoot"/>
+      </p:par>
+    </p:tnLst>
+  </p:timing>
 </p:sld>
 </file>
 
@@ -3659,6 +3841,18 @@
   <p:clrMapOvr>
     <a:masterClrMapping/>
   </p:clrMapOvr>
+  <mc:AlternateContent xmlns:mc="http://schemas.openxmlformats.org/markup-compatibility/2006">
+    <mc:Choice xmlns:p14="http://schemas.microsoft.com/office/powerpoint/2010/main" Requires="p14">
+      <p:transition spd="med" p14:dur="700">
+        <p:fade/>
+      </p:transition>
+    </mc:Choice>
+    <mc:Fallback>
+      <p:transition spd="med">
+        <p:fade/>
+      </p:transition>
+    </mc:Fallback>
+  </mc:AlternateContent>
 </p:sld>
 </file>
 
@@ -3831,6 +4025,18 @@
   <p:clrMapOvr>
     <a:masterClrMapping/>
   </p:clrMapOvr>
+  <mc:AlternateContent xmlns:mc="http://schemas.openxmlformats.org/markup-compatibility/2006">
+    <mc:Choice xmlns:p14="http://schemas.microsoft.com/office/powerpoint/2010/main" Requires="p14">
+      <p:transition spd="med" p14:dur="700">
+        <p:fade/>
+      </p:transition>
+    </mc:Choice>
+    <mc:Fallback>
+      <p:transition spd="med">
+        <p:fade/>
+      </p:transition>
+    </mc:Fallback>
+  </mc:AlternateContent>
 </p:sld>
 </file>
 
@@ -3911,6 +4117,18 @@
   <p:clrMapOvr>
     <a:masterClrMapping/>
   </p:clrMapOvr>
+  <mc:AlternateContent xmlns:mc="http://schemas.openxmlformats.org/markup-compatibility/2006">
+    <mc:Choice xmlns:p14="http://schemas.microsoft.com/office/powerpoint/2010/main" Requires="p14">
+      <p:transition spd="med" p14:dur="700">
+        <p:fade/>
+      </p:transition>
+    </mc:Choice>
+    <mc:Fallback>
+      <p:transition spd="med">
+        <p:fade/>
+      </p:transition>
+    </mc:Fallback>
+  </mc:AlternateContent>
 </p:sld>
 </file>
 
@@ -4217,6 +4435,25 @@
   <p:clrMapOvr>
     <a:masterClrMapping/>
   </p:clrMapOvr>
+  <mc:AlternateContent xmlns:mc="http://schemas.openxmlformats.org/markup-compatibility/2006">
+    <mc:Choice xmlns:p14="http://schemas.microsoft.com/office/powerpoint/2010/main" Requires="p14">
+      <p:transition spd="med" p14:dur="700">
+        <p:fade/>
+      </p:transition>
+    </mc:Choice>
+    <mc:Fallback>
+      <p:transition spd="med">
+        <p:fade/>
+      </p:transition>
+    </mc:Fallback>
+  </mc:AlternateContent>
+  <p:timing>
+    <p:tnLst>
+      <p:par>
+        <p:cTn id="1" dur="indefinite" restart="never" nodeType="tmRoot"/>
+      </p:par>
+    </p:tnLst>
+  </p:timing>
 </p:sld>
 </file>
 
@@ -4341,6 +4578,25 @@
   <p:clrMapOvr>
     <a:masterClrMapping/>
   </p:clrMapOvr>
+  <mc:AlternateContent xmlns:mc="http://schemas.openxmlformats.org/markup-compatibility/2006">
+    <mc:Choice xmlns:p14="http://schemas.microsoft.com/office/powerpoint/2010/main" Requires="p14">
+      <p:transition spd="med" p14:dur="700">
+        <p:fade/>
+      </p:transition>
+    </mc:Choice>
+    <mc:Fallback>
+      <p:transition spd="med">
+        <p:fade/>
+      </p:transition>
+    </mc:Fallback>
+  </mc:AlternateContent>
+  <p:timing>
+    <p:tnLst>
+      <p:par>
+        <p:cTn id="1" dur="indefinite" restart="never" nodeType="tmRoot"/>
+      </p:par>
+    </p:tnLst>
+  </p:timing>
 </p:sld>
 </file>
 
@@ -4405,7 +4661,7 @@
         </p:nvGraphicFramePr>
         <p:xfrm>
           <a:off x="1143000" y="2057400"/>
-          <a:ext cx="7002780" cy="2873394"/>
+          <a:ext cx="7002780" cy="2891491"/>
         </p:xfrm>
         <a:graphic>
           <a:graphicData uri="http://schemas.openxmlformats.org/drawingml/2006/table">
@@ -4826,6 +5082,25 @@
   <p:clrMapOvr>
     <a:masterClrMapping/>
   </p:clrMapOvr>
+  <mc:AlternateContent xmlns:mc="http://schemas.openxmlformats.org/markup-compatibility/2006">
+    <mc:Choice xmlns:p14="http://schemas.microsoft.com/office/powerpoint/2010/main" Requires="p14">
+      <p:transition spd="med" p14:dur="700">
+        <p:fade/>
+      </p:transition>
+    </mc:Choice>
+    <mc:Fallback>
+      <p:transition spd="med">
+        <p:fade/>
+      </p:transition>
+    </mc:Fallback>
+  </mc:AlternateContent>
+  <p:timing>
+    <p:tnLst>
+      <p:par>
+        <p:cTn id="1" dur="indefinite" restart="never" nodeType="tmRoot"/>
+      </p:par>
+    </p:tnLst>
+  </p:timing>
 </p:sld>
 </file>
 
@@ -4960,6 +5235,25 @@
   <p:clrMapOvr>
     <a:masterClrMapping/>
   </p:clrMapOvr>
+  <mc:AlternateContent xmlns:mc="http://schemas.openxmlformats.org/markup-compatibility/2006">
+    <mc:Choice xmlns:p14="http://schemas.microsoft.com/office/powerpoint/2010/main" Requires="p14">
+      <p:transition spd="med" p14:dur="700">
+        <p:fade/>
+      </p:transition>
+    </mc:Choice>
+    <mc:Fallback>
+      <p:transition spd="med">
+        <p:fade/>
+      </p:transition>
+    </mc:Fallback>
+  </mc:AlternateContent>
+  <p:timing>
+    <p:tnLst>
+      <p:par>
+        <p:cTn id="1" dur="indefinite" restart="never" nodeType="tmRoot"/>
+      </p:par>
+    </p:tnLst>
+  </p:timing>
 </p:sld>
 </file>
 
@@ -5050,6 +5344,25 @@
   <p:clrMapOvr>
     <a:masterClrMapping/>
   </p:clrMapOvr>
+  <mc:AlternateContent xmlns:mc="http://schemas.openxmlformats.org/markup-compatibility/2006">
+    <mc:Choice xmlns:p14="http://schemas.microsoft.com/office/powerpoint/2010/main" Requires="p14">
+      <p:transition spd="med" p14:dur="700">
+        <p:fade/>
+      </p:transition>
+    </mc:Choice>
+    <mc:Fallback>
+      <p:transition spd="med">
+        <p:fade/>
+      </p:transition>
+    </mc:Fallback>
+  </mc:AlternateContent>
+  <p:timing>
+    <p:tnLst>
+      <p:par>
+        <p:cTn id="1" dur="indefinite" restart="never" nodeType="tmRoot"/>
+      </p:par>
+    </p:tnLst>
+  </p:timing>
 </p:sld>
 </file>
 
@@ -5140,6 +5453,25 @@
   <p:clrMapOvr>
     <a:masterClrMapping/>
   </p:clrMapOvr>
+  <mc:AlternateContent xmlns:mc="http://schemas.openxmlformats.org/markup-compatibility/2006">
+    <mc:Choice xmlns:p14="http://schemas.microsoft.com/office/powerpoint/2010/main" Requires="p14">
+      <p:transition spd="med" p14:dur="700">
+        <p:fade/>
+      </p:transition>
+    </mc:Choice>
+    <mc:Fallback>
+      <p:transition spd="med">
+        <p:fade/>
+      </p:transition>
+    </mc:Fallback>
+  </mc:AlternateContent>
+  <p:timing>
+    <p:tnLst>
+      <p:par>
+        <p:cTn id="1" dur="indefinite" restart="never" nodeType="tmRoot"/>
+      </p:par>
+    </p:tnLst>
+  </p:timing>
 </p:sld>
 </file>
 
@@ -5296,6 +5628,25 @@
   <p:clrMapOvr>
     <a:masterClrMapping/>
   </p:clrMapOvr>
+  <mc:AlternateContent xmlns:mc="http://schemas.openxmlformats.org/markup-compatibility/2006">
+    <mc:Choice xmlns:p14="http://schemas.microsoft.com/office/powerpoint/2010/main" Requires="p14">
+      <p:transition spd="med" p14:dur="700">
+        <p:fade/>
+      </p:transition>
+    </mc:Choice>
+    <mc:Fallback>
+      <p:transition spd="med">
+        <p:fade/>
+      </p:transition>
+    </mc:Fallback>
+  </mc:AlternateContent>
+  <p:timing>
+    <p:tnLst>
+      <p:par>
+        <p:cTn id="1" dur="indefinite" restart="never" nodeType="tmRoot"/>
+      </p:par>
+    </p:tnLst>
+  </p:timing>
 </p:sld>
 </file>
 
@@ -5440,6 +5791,25 @@
   <p:clrMapOvr>
     <a:masterClrMapping/>
   </p:clrMapOvr>
+  <mc:AlternateContent xmlns:mc="http://schemas.openxmlformats.org/markup-compatibility/2006">
+    <mc:Choice xmlns:p14="http://schemas.microsoft.com/office/powerpoint/2010/main" Requires="p14">
+      <p:transition spd="med" p14:dur="700">
+        <p:fade/>
+      </p:transition>
+    </mc:Choice>
+    <mc:Fallback>
+      <p:transition spd="med">
+        <p:fade/>
+      </p:transition>
+    </mc:Fallback>
+  </mc:AlternateContent>
+  <p:timing>
+    <p:tnLst>
+      <p:par>
+        <p:cTn id="1" dur="indefinite" restart="never" nodeType="tmRoot"/>
+      </p:par>
+    </p:tnLst>
+  </p:timing>
 </p:sld>
 </file>
 

</xml_diff>